<commit_message>
updated for final submission
</commit_message>
<xml_diff>
--- a/Project 1.pptx
+++ b/Project 1.pptx
@@ -258,7 +258,7 @@
           <a:p>
             <a:fld id="{59A7976A-6848-437F-93DA-62EC9335AAE9}" type="datetimeFigureOut">
               <a:rPr lang="en-US" smtClean="0"/>
-              <a:t>8/8/2024</a:t>
+              <a:t>8/9/24</a:t>
             </a:fld>
             <a:endParaRPr lang="en-US"/>
           </a:p>
@@ -575,7 +575,7 @@
           <a:noFill/>
           <a:extLst>
             <a:ext uri="{909E8E84-426E-40dd-AFC4-6F175D3DCCD1}">
-              <a14:hiddenFill xmlns:a14="http://schemas.microsoft.com/office/drawing/2010/main" xmlns="">
+              <a14:hiddenFill xmlns="" xmlns:a14="http://schemas.microsoft.com/office/drawing/2010/main">
                 <a:solidFill>
                   <a:srgbClr val="FFFFFF"/>
                 </a:solidFill>
@@ -635,7 +635,7 @@
             </a:ln>
             <a:extLst>
               <a:ext uri="{91240B29-F687-4f45-9708-019B960494DF}">
-                <a14:hiddenLine xmlns:a14="http://schemas.microsoft.com/office/drawing/2010/main" xmlns="" w="9525">
+                <a14:hiddenLine xmlns="" xmlns:a14="http://schemas.microsoft.com/office/drawing/2010/main" w="9525">
                   <a:solidFill>
                     <a:srgbClr val="000000"/>
                   </a:solidFill>
@@ -725,7 +725,7 @@
             </a:ln>
             <a:extLst>
               <a:ext uri="{91240B29-F687-4f45-9708-019B960494DF}">
-                <a14:hiddenLine xmlns:a14="http://schemas.microsoft.com/office/drawing/2010/main" xmlns="" w="9525">
+                <a14:hiddenLine xmlns="" xmlns:a14="http://schemas.microsoft.com/office/drawing/2010/main" w="9525">
                   <a:solidFill>
                     <a:srgbClr val="000000"/>
                   </a:solidFill>
@@ -815,7 +815,7 @@
             </a:ln>
             <a:extLst>
               <a:ext uri="{91240B29-F687-4f45-9708-019B960494DF}">
-                <a14:hiddenLine xmlns:a14="http://schemas.microsoft.com/office/drawing/2010/main" xmlns="" w="9525">
+                <a14:hiddenLine xmlns="" xmlns:a14="http://schemas.microsoft.com/office/drawing/2010/main" w="9525">
                   <a:solidFill>
                     <a:srgbClr val="000000"/>
                   </a:solidFill>
@@ -849,7 +849,7 @@
             </a:ln>
             <a:extLst>
               <a:ext uri="{91240B29-F687-4f45-9708-019B960494DF}">
-                <a14:hiddenLine xmlns:a14="http://schemas.microsoft.com/office/drawing/2010/main" xmlns="" w="9525">
+                <a14:hiddenLine xmlns="" xmlns:a14="http://schemas.microsoft.com/office/drawing/2010/main" w="9525">
                   <a:solidFill>
                     <a:srgbClr val="000000"/>
                   </a:solidFill>
@@ -939,7 +939,7 @@
             </a:ln>
             <a:extLst>
               <a:ext uri="{91240B29-F687-4f45-9708-019B960494DF}">
-                <a14:hiddenLine xmlns:a14="http://schemas.microsoft.com/office/drawing/2010/main" xmlns="" w="9525">
+                <a14:hiddenLine xmlns="" xmlns:a14="http://schemas.microsoft.com/office/drawing/2010/main" w="9525">
                   <a:solidFill>
                     <a:srgbClr val="000000"/>
                   </a:solidFill>
@@ -1001,7 +1001,7 @@
             </a:ln>
             <a:extLst>
               <a:ext uri="{91240B29-F687-4f45-9708-019B960494DF}">
-                <a14:hiddenLine xmlns:a14="http://schemas.microsoft.com/office/drawing/2010/main" xmlns="" w="9525">
+                <a14:hiddenLine xmlns="" xmlns:a14="http://schemas.microsoft.com/office/drawing/2010/main" w="9525">
                   <a:solidFill>
                     <a:srgbClr val="000000"/>
                   </a:solidFill>
@@ -1063,7 +1063,7 @@
             </a:ln>
             <a:extLst>
               <a:ext uri="{91240B29-F687-4f45-9708-019B960494DF}">
-                <a14:hiddenLine xmlns:a14="http://schemas.microsoft.com/office/drawing/2010/main" xmlns="" w="9525">
+                <a14:hiddenLine xmlns="" xmlns:a14="http://schemas.microsoft.com/office/drawing/2010/main" w="9525">
                   <a:solidFill>
                     <a:srgbClr val="000000"/>
                   </a:solidFill>
@@ -1153,7 +1153,7 @@
             </a:ln>
             <a:extLst>
               <a:ext uri="{91240B29-F687-4f45-9708-019B960494DF}">
-                <a14:hiddenLine xmlns:a14="http://schemas.microsoft.com/office/drawing/2010/main" xmlns="" w="9525">
+                <a14:hiddenLine xmlns="" xmlns:a14="http://schemas.microsoft.com/office/drawing/2010/main" w="9525">
                   <a:solidFill>
                     <a:srgbClr val="000000"/>
                   </a:solidFill>
@@ -1215,7 +1215,7 @@
             </a:ln>
             <a:extLst>
               <a:ext uri="{91240B29-F687-4f45-9708-019B960494DF}">
-                <a14:hiddenLine xmlns:a14="http://schemas.microsoft.com/office/drawing/2010/main" xmlns="" w="9525">
+                <a14:hiddenLine xmlns="" xmlns:a14="http://schemas.microsoft.com/office/drawing/2010/main" w="9525">
                   <a:solidFill>
                     <a:srgbClr val="000000"/>
                   </a:solidFill>
@@ -1277,7 +1277,7 @@
             </a:ln>
             <a:extLst>
               <a:ext uri="{91240B29-F687-4f45-9708-019B960494DF}">
-                <a14:hiddenLine xmlns:a14="http://schemas.microsoft.com/office/drawing/2010/main" xmlns="" w="9525">
+                <a14:hiddenLine xmlns="" xmlns:a14="http://schemas.microsoft.com/office/drawing/2010/main" w="9525">
                   <a:solidFill>
                     <a:srgbClr val="000000"/>
                   </a:solidFill>
@@ -1367,7 +1367,7 @@
             </a:ln>
             <a:extLst>
               <a:ext uri="{91240B29-F687-4f45-9708-019B960494DF}">
-                <a14:hiddenLine xmlns:a14="http://schemas.microsoft.com/office/drawing/2010/main" xmlns="" w="9525">
+                <a14:hiddenLine xmlns="" xmlns:a14="http://schemas.microsoft.com/office/drawing/2010/main" w="9525">
                   <a:solidFill>
                     <a:srgbClr val="000000"/>
                   </a:solidFill>
@@ -1457,7 +1457,7 @@
             </a:ln>
             <a:extLst>
               <a:ext uri="{91240B29-F687-4f45-9708-019B960494DF}">
-                <a14:hiddenLine xmlns:a14="http://schemas.microsoft.com/office/drawing/2010/main" xmlns="" w="9525">
+                <a14:hiddenLine xmlns="" xmlns:a14="http://schemas.microsoft.com/office/drawing/2010/main" w="9525">
                   <a:solidFill>
                     <a:srgbClr val="000000"/>
                   </a:solidFill>
@@ -1519,7 +1519,7 @@
             </a:ln>
             <a:extLst>
               <a:ext uri="{91240B29-F687-4f45-9708-019B960494DF}">
-                <a14:hiddenLine xmlns:a14="http://schemas.microsoft.com/office/drawing/2010/main" xmlns="" w="9525">
+                <a14:hiddenLine xmlns="" xmlns:a14="http://schemas.microsoft.com/office/drawing/2010/main" w="9525">
                   <a:solidFill>
                     <a:srgbClr val="000000"/>
                   </a:solidFill>
@@ -1629,7 +1629,7 @@
             </a:ln>
             <a:extLst>
               <a:ext uri="{91240B29-F687-4f45-9708-019B960494DF}">
-                <a14:hiddenLine xmlns:a14="http://schemas.microsoft.com/office/drawing/2010/main" xmlns="" w="9525">
+                <a14:hiddenLine xmlns="" xmlns:a14="http://schemas.microsoft.com/office/drawing/2010/main" w="9525">
                   <a:solidFill>
                     <a:srgbClr val="000000"/>
                   </a:solidFill>
@@ -1691,7 +1691,7 @@
             </a:ln>
             <a:extLst>
               <a:ext uri="{91240B29-F687-4f45-9708-019B960494DF}">
-                <a14:hiddenLine xmlns:a14="http://schemas.microsoft.com/office/drawing/2010/main" xmlns="" w="9525">
+                <a14:hiddenLine xmlns="" xmlns:a14="http://schemas.microsoft.com/office/drawing/2010/main" w="9525">
                   <a:solidFill>
                     <a:srgbClr val="000000"/>
                   </a:solidFill>
@@ -1781,7 +1781,7 @@
             </a:ln>
             <a:extLst>
               <a:ext uri="{91240B29-F687-4f45-9708-019B960494DF}">
-                <a14:hiddenLine xmlns:a14="http://schemas.microsoft.com/office/drawing/2010/main" xmlns="" w="9525">
+                <a14:hiddenLine xmlns="" xmlns:a14="http://schemas.microsoft.com/office/drawing/2010/main" w="9525">
                   <a:solidFill>
                     <a:srgbClr val="000000"/>
                   </a:solidFill>
@@ -1871,7 +1871,7 @@
             </a:ln>
             <a:extLst>
               <a:ext uri="{91240B29-F687-4f45-9708-019B960494DF}">
-                <a14:hiddenLine xmlns:a14="http://schemas.microsoft.com/office/drawing/2010/main" xmlns="" w="9525">
+                <a14:hiddenLine xmlns="" xmlns:a14="http://schemas.microsoft.com/office/drawing/2010/main" w="9525">
                   <a:solidFill>
                     <a:srgbClr val="000000"/>
                   </a:solidFill>
@@ -1933,7 +1933,7 @@
             </a:ln>
             <a:extLst>
               <a:ext uri="{91240B29-F687-4f45-9708-019B960494DF}">
-                <a14:hiddenLine xmlns:a14="http://schemas.microsoft.com/office/drawing/2010/main" xmlns="" w="9525">
+                <a14:hiddenLine xmlns="" xmlns:a14="http://schemas.microsoft.com/office/drawing/2010/main" w="9525">
                   <a:solidFill>
                     <a:srgbClr val="000000"/>
                   </a:solidFill>
@@ -2023,7 +2023,7 @@
             </a:ln>
             <a:extLst>
               <a:ext uri="{91240B29-F687-4f45-9708-019B960494DF}">
-                <a14:hiddenLine xmlns:a14="http://schemas.microsoft.com/office/drawing/2010/main" xmlns="" w="9525">
+                <a14:hiddenLine xmlns="" xmlns:a14="http://schemas.microsoft.com/office/drawing/2010/main" w="9525">
                   <a:solidFill>
                     <a:srgbClr val="000000"/>
                   </a:solidFill>
@@ -2113,7 +2113,7 @@
             </a:ln>
             <a:extLst>
               <a:ext uri="{91240B29-F687-4f45-9708-019B960494DF}">
-                <a14:hiddenLine xmlns:a14="http://schemas.microsoft.com/office/drawing/2010/main" xmlns="" w="9525">
+                <a14:hiddenLine xmlns="" xmlns:a14="http://schemas.microsoft.com/office/drawing/2010/main" w="9525">
                   <a:solidFill>
                     <a:srgbClr val="000000"/>
                   </a:solidFill>
@@ -2169,7 +2169,7 @@
             </a:ln>
             <a:extLst>
               <a:ext uri="{91240B29-F687-4f45-9708-019B960494DF}">
-                <a14:hiddenLine xmlns:a14="http://schemas.microsoft.com/office/drawing/2010/main" xmlns="" w="9525">
+                <a14:hiddenLine xmlns="" xmlns:a14="http://schemas.microsoft.com/office/drawing/2010/main" w="9525">
                   <a:solidFill>
                     <a:srgbClr val="000000"/>
                   </a:solidFill>
@@ -2259,7 +2259,7 @@
             </a:ln>
             <a:extLst>
               <a:ext uri="{91240B29-F687-4f45-9708-019B960494DF}">
-                <a14:hiddenLine xmlns:a14="http://schemas.microsoft.com/office/drawing/2010/main" xmlns="" w="9525">
+                <a14:hiddenLine xmlns="" xmlns:a14="http://schemas.microsoft.com/office/drawing/2010/main" w="9525">
                   <a:solidFill>
                     <a:srgbClr val="000000"/>
                   </a:solidFill>
@@ -2315,7 +2315,7 @@
             </a:ln>
             <a:extLst>
               <a:ext uri="{91240B29-F687-4f45-9708-019B960494DF}">
-                <a14:hiddenLine xmlns:a14="http://schemas.microsoft.com/office/drawing/2010/main" xmlns="" w="9525">
+                <a14:hiddenLine xmlns="" xmlns:a14="http://schemas.microsoft.com/office/drawing/2010/main" w="9525">
                   <a:solidFill>
                     <a:srgbClr val="000000"/>
                   </a:solidFill>
@@ -2405,7 +2405,7 @@
             </a:ln>
             <a:extLst>
               <a:ext uri="{91240B29-F687-4f45-9708-019B960494DF}">
-                <a14:hiddenLine xmlns:a14="http://schemas.microsoft.com/office/drawing/2010/main" xmlns="" w="9525">
+                <a14:hiddenLine xmlns="" xmlns:a14="http://schemas.microsoft.com/office/drawing/2010/main" w="9525">
                   <a:solidFill>
                     <a:srgbClr val="000000"/>
                   </a:solidFill>
@@ -2473,7 +2473,7 @@
             </a:ln>
             <a:extLst>
               <a:ext uri="{91240B29-F687-4f45-9708-019B960494DF}">
-                <a14:hiddenLine xmlns:a14="http://schemas.microsoft.com/office/drawing/2010/main" xmlns="" w="9525">
+                <a14:hiddenLine xmlns="" xmlns:a14="http://schemas.microsoft.com/office/drawing/2010/main" w="9525">
                   <a:solidFill>
                     <a:srgbClr val="000000"/>
                   </a:solidFill>
@@ -2563,7 +2563,7 @@
             </a:ln>
             <a:extLst>
               <a:ext uri="{91240B29-F687-4f45-9708-019B960494DF}">
-                <a14:hiddenLine xmlns:a14="http://schemas.microsoft.com/office/drawing/2010/main" xmlns="" w="9525">
+                <a14:hiddenLine xmlns="" xmlns:a14="http://schemas.microsoft.com/office/drawing/2010/main" w="9525">
                   <a:solidFill>
                     <a:srgbClr val="000000"/>
                   </a:solidFill>
@@ -2631,7 +2631,7 @@
             </a:ln>
             <a:extLst>
               <a:ext uri="{91240B29-F687-4f45-9708-019B960494DF}">
-                <a14:hiddenLine xmlns:a14="http://schemas.microsoft.com/office/drawing/2010/main" xmlns="" w="9525">
+                <a14:hiddenLine xmlns="" xmlns:a14="http://schemas.microsoft.com/office/drawing/2010/main" w="9525">
                   <a:solidFill>
                     <a:srgbClr val="000000"/>
                   </a:solidFill>
@@ -2721,7 +2721,7 @@
             </a:ln>
             <a:extLst>
               <a:ext uri="{91240B29-F687-4f45-9708-019B960494DF}">
-                <a14:hiddenLine xmlns:a14="http://schemas.microsoft.com/office/drawing/2010/main" xmlns="" w="9525">
+                <a14:hiddenLine xmlns="" xmlns:a14="http://schemas.microsoft.com/office/drawing/2010/main" w="9525">
                   <a:solidFill>
                     <a:srgbClr val="000000"/>
                   </a:solidFill>
@@ -2755,7 +2755,7 @@
             </a:ln>
             <a:extLst>
               <a:ext uri="{91240B29-F687-4f45-9708-019B960494DF}">
-                <a14:hiddenLine xmlns:a14="http://schemas.microsoft.com/office/drawing/2010/main" xmlns="" w="9525">
+                <a14:hiddenLine xmlns="" xmlns:a14="http://schemas.microsoft.com/office/drawing/2010/main" w="9525">
                   <a:solidFill>
                     <a:srgbClr val="000000"/>
                   </a:solidFill>
@@ -2845,7 +2845,7 @@
             </a:ln>
             <a:extLst>
               <a:ext uri="{91240B29-F687-4f45-9708-019B960494DF}">
-                <a14:hiddenLine xmlns:a14="http://schemas.microsoft.com/office/drawing/2010/main" xmlns="" w="9525">
+                <a14:hiddenLine xmlns="" xmlns:a14="http://schemas.microsoft.com/office/drawing/2010/main" w="9525">
                   <a:solidFill>
                     <a:srgbClr val="000000"/>
                   </a:solidFill>
@@ -2907,7 +2907,7 @@
             </a:ln>
             <a:extLst>
               <a:ext uri="{91240B29-F687-4f45-9708-019B960494DF}">
-                <a14:hiddenLine xmlns:a14="http://schemas.microsoft.com/office/drawing/2010/main" xmlns="" w="9525">
+                <a14:hiddenLine xmlns="" xmlns:a14="http://schemas.microsoft.com/office/drawing/2010/main" w="9525">
                   <a:solidFill>
                     <a:srgbClr val="000000"/>
                   </a:solidFill>
@@ -2969,7 +2969,7 @@
             </a:ln>
             <a:extLst>
               <a:ext uri="{91240B29-F687-4f45-9708-019B960494DF}">
-                <a14:hiddenLine xmlns:a14="http://schemas.microsoft.com/office/drawing/2010/main" xmlns="" w="9525">
+                <a14:hiddenLine xmlns="" xmlns:a14="http://schemas.microsoft.com/office/drawing/2010/main" w="9525">
                   <a:solidFill>
                     <a:srgbClr val="000000"/>
                   </a:solidFill>
@@ -3059,7 +3059,7 @@
             </a:ln>
             <a:extLst>
               <a:ext uri="{91240B29-F687-4f45-9708-019B960494DF}">
-                <a14:hiddenLine xmlns:a14="http://schemas.microsoft.com/office/drawing/2010/main" xmlns="" w="9525">
+                <a14:hiddenLine xmlns="" xmlns:a14="http://schemas.microsoft.com/office/drawing/2010/main" w="9525">
                   <a:solidFill>
                     <a:srgbClr val="000000"/>
                   </a:solidFill>
@@ -3127,7 +3127,7 @@
             </a:ln>
             <a:extLst>
               <a:ext uri="{91240B29-F687-4f45-9708-019B960494DF}">
-                <a14:hiddenLine xmlns:a14="http://schemas.microsoft.com/office/drawing/2010/main" xmlns="" w="9525">
+                <a14:hiddenLine xmlns="" xmlns:a14="http://schemas.microsoft.com/office/drawing/2010/main" w="9525">
                   <a:solidFill>
                     <a:srgbClr val="000000"/>
                   </a:solidFill>
@@ -3189,7 +3189,7 @@
             </a:ln>
             <a:extLst>
               <a:ext uri="{91240B29-F687-4f45-9708-019B960494DF}">
-                <a14:hiddenLine xmlns:a14="http://schemas.microsoft.com/office/drawing/2010/main" xmlns="" w="9525">
+                <a14:hiddenLine xmlns="" xmlns:a14="http://schemas.microsoft.com/office/drawing/2010/main" w="9525">
                   <a:solidFill>
                     <a:srgbClr val="000000"/>
                   </a:solidFill>
@@ -3279,7 +3279,7 @@
             </a:ln>
             <a:extLst>
               <a:ext uri="{91240B29-F687-4f45-9708-019B960494DF}">
-                <a14:hiddenLine xmlns:a14="http://schemas.microsoft.com/office/drawing/2010/main" xmlns="" w="9525">
+                <a14:hiddenLine xmlns="" xmlns:a14="http://schemas.microsoft.com/office/drawing/2010/main" w="9525">
                   <a:solidFill>
                     <a:srgbClr val="000000"/>
                   </a:solidFill>
@@ -3341,7 +3341,7 @@
             </a:ln>
             <a:extLst>
               <a:ext uri="{91240B29-F687-4f45-9708-019B960494DF}">
-                <a14:hiddenLine xmlns:a14="http://schemas.microsoft.com/office/drawing/2010/main" xmlns="" w="9525">
+                <a14:hiddenLine xmlns="" xmlns:a14="http://schemas.microsoft.com/office/drawing/2010/main" w="9525">
                   <a:solidFill>
                     <a:srgbClr val="000000"/>
                   </a:solidFill>
@@ -3431,7 +3431,7 @@
             </a:ln>
             <a:extLst>
               <a:ext uri="{91240B29-F687-4f45-9708-019B960494DF}">
-                <a14:hiddenLine xmlns:a14="http://schemas.microsoft.com/office/drawing/2010/main" xmlns="" w="9525">
+                <a14:hiddenLine xmlns="" xmlns:a14="http://schemas.microsoft.com/office/drawing/2010/main" w="9525">
                   <a:solidFill>
                     <a:srgbClr val="000000"/>
                   </a:solidFill>
@@ -3493,7 +3493,7 @@
             </a:ln>
             <a:extLst>
               <a:ext uri="{91240B29-F687-4f45-9708-019B960494DF}">
-                <a14:hiddenLine xmlns:a14="http://schemas.microsoft.com/office/drawing/2010/main" xmlns="" w="9525">
+                <a14:hiddenLine xmlns="" xmlns:a14="http://schemas.microsoft.com/office/drawing/2010/main" w="9525">
                   <a:solidFill>
                     <a:srgbClr val="000000"/>
                   </a:solidFill>
@@ -3583,7 +3583,7 @@
             </a:ln>
             <a:extLst>
               <a:ext uri="{91240B29-F687-4f45-9708-019B960494DF}">
-                <a14:hiddenLine xmlns:a14="http://schemas.microsoft.com/office/drawing/2010/main" xmlns="" w="9525">
+                <a14:hiddenLine xmlns="" xmlns:a14="http://schemas.microsoft.com/office/drawing/2010/main" w="9525">
                   <a:solidFill>
                     <a:srgbClr val="000000"/>
                   </a:solidFill>
@@ -3617,7 +3617,7 @@
             </a:ln>
             <a:extLst>
               <a:ext uri="{91240B29-F687-4f45-9708-019B960494DF}">
-                <a14:hiddenLine xmlns:a14="http://schemas.microsoft.com/office/drawing/2010/main" xmlns="" w="9525">
+                <a14:hiddenLine xmlns="" xmlns:a14="http://schemas.microsoft.com/office/drawing/2010/main" w="9525">
                   <a:solidFill>
                     <a:srgbClr val="000000"/>
                   </a:solidFill>
@@ -3682,7 +3682,7 @@
             </a:ln>
             <a:extLst>
               <a:ext uri="{91240B29-F687-4f45-9708-019B960494DF}">
-                <a14:hiddenLine xmlns:a14="http://schemas.microsoft.com/office/drawing/2010/main" xmlns="" w="9525">
+                <a14:hiddenLine xmlns="" xmlns:a14="http://schemas.microsoft.com/office/drawing/2010/main" w="9525">
                   <a:solidFill>
                     <a:srgbClr val="000000"/>
                   </a:solidFill>
@@ -3772,7 +3772,7 @@
             </a:ln>
             <a:extLst>
               <a:ext uri="{91240B29-F687-4f45-9708-019B960494DF}">
-                <a14:hiddenLine xmlns:a14="http://schemas.microsoft.com/office/drawing/2010/main" xmlns="" w="9525">
+                <a14:hiddenLine xmlns="" xmlns:a14="http://schemas.microsoft.com/office/drawing/2010/main" w="9525">
                   <a:solidFill>
                     <a:srgbClr val="000000"/>
                   </a:solidFill>
@@ -3834,7 +3834,7 @@
             </a:ln>
             <a:extLst>
               <a:ext uri="{91240B29-F687-4f45-9708-019B960494DF}">
-                <a14:hiddenLine xmlns:a14="http://schemas.microsoft.com/office/drawing/2010/main" xmlns="" w="9525">
+                <a14:hiddenLine xmlns="" xmlns:a14="http://schemas.microsoft.com/office/drawing/2010/main" w="9525">
                   <a:solidFill>
                     <a:srgbClr val="000000"/>
                   </a:solidFill>
@@ -3924,7 +3924,7 @@
             </a:ln>
             <a:extLst>
               <a:ext uri="{91240B29-F687-4f45-9708-019B960494DF}">
-                <a14:hiddenLine xmlns:a14="http://schemas.microsoft.com/office/drawing/2010/main" xmlns="" w="9525">
+                <a14:hiddenLine xmlns="" xmlns:a14="http://schemas.microsoft.com/office/drawing/2010/main" w="9525">
                   <a:solidFill>
                     <a:srgbClr val="000000"/>
                   </a:solidFill>
@@ -4014,7 +4014,7 @@
             </a:ln>
             <a:extLst>
               <a:ext uri="{91240B29-F687-4f45-9708-019B960494DF}">
-                <a14:hiddenLine xmlns:a14="http://schemas.microsoft.com/office/drawing/2010/main" xmlns="" w="9525">
+                <a14:hiddenLine xmlns="" xmlns:a14="http://schemas.microsoft.com/office/drawing/2010/main" w="9525">
                   <a:solidFill>
                     <a:srgbClr val="000000"/>
                   </a:solidFill>
@@ -4079,7 +4079,7 @@
             </a:ln>
             <a:extLst>
               <a:ext uri="{91240B29-F687-4f45-9708-019B960494DF}">
-                <a14:hiddenLine xmlns:a14="http://schemas.microsoft.com/office/drawing/2010/main" xmlns="" w="9525">
+                <a14:hiddenLine xmlns="" xmlns:a14="http://schemas.microsoft.com/office/drawing/2010/main" w="9525">
                   <a:solidFill>
                     <a:srgbClr val="000000"/>
                   </a:solidFill>
@@ -4141,7 +4141,7 @@
             </a:ln>
             <a:extLst>
               <a:ext uri="{91240B29-F687-4f45-9708-019B960494DF}">
-                <a14:hiddenLine xmlns:a14="http://schemas.microsoft.com/office/drawing/2010/main" xmlns="" w="9525">
+                <a14:hiddenLine xmlns="" xmlns:a14="http://schemas.microsoft.com/office/drawing/2010/main" w="9525">
                   <a:solidFill>
                     <a:srgbClr val="000000"/>
                   </a:solidFill>
@@ -4231,7 +4231,7 @@
             </a:ln>
             <a:extLst>
               <a:ext uri="{91240B29-F687-4f45-9708-019B960494DF}">
-                <a14:hiddenLine xmlns:a14="http://schemas.microsoft.com/office/drawing/2010/main" xmlns="" w="9525">
+                <a14:hiddenLine xmlns="" xmlns:a14="http://schemas.microsoft.com/office/drawing/2010/main" w="9525">
                   <a:solidFill>
                     <a:srgbClr val="000000"/>
                   </a:solidFill>
@@ -4321,7 +4321,7 @@
             </a:ln>
             <a:extLst>
               <a:ext uri="{91240B29-F687-4f45-9708-019B960494DF}">
-                <a14:hiddenLine xmlns:a14="http://schemas.microsoft.com/office/drawing/2010/main" xmlns="" w="9525">
+                <a14:hiddenLine xmlns="" xmlns:a14="http://schemas.microsoft.com/office/drawing/2010/main" w="9525">
                   <a:solidFill>
                     <a:srgbClr val="000000"/>
                   </a:solidFill>
@@ -4383,7 +4383,7 @@
             </a:ln>
             <a:extLst>
               <a:ext uri="{91240B29-F687-4f45-9708-019B960494DF}">
-                <a14:hiddenLine xmlns:a14="http://schemas.microsoft.com/office/drawing/2010/main" xmlns="" w="9525">
+                <a14:hiddenLine xmlns="" xmlns:a14="http://schemas.microsoft.com/office/drawing/2010/main" w="9525">
                   <a:solidFill>
                     <a:srgbClr val="000000"/>
                   </a:solidFill>
@@ -4503,7 +4503,7 @@
             </a:ln>
             <a:extLst>
               <a:ext uri="{91240B29-F687-4f45-9708-019B960494DF}">
-                <a14:hiddenLine xmlns:a14="http://schemas.microsoft.com/office/drawing/2010/main" xmlns="" w="9525">
+                <a14:hiddenLine xmlns="" xmlns:a14="http://schemas.microsoft.com/office/drawing/2010/main" w="9525">
                   <a:solidFill>
                     <a:srgbClr val="000000"/>
                   </a:solidFill>
@@ -4571,7 +4571,7 @@
             </a:ln>
             <a:extLst>
               <a:ext uri="{91240B29-F687-4f45-9708-019B960494DF}">
-                <a14:hiddenLine xmlns:a14="http://schemas.microsoft.com/office/drawing/2010/main" xmlns="" w="9525">
+                <a14:hiddenLine xmlns="" xmlns:a14="http://schemas.microsoft.com/office/drawing/2010/main" w="9525">
                   <a:solidFill>
                     <a:srgbClr val="000000"/>
                   </a:solidFill>
@@ -4661,7 +4661,7 @@
             </a:ln>
             <a:extLst>
               <a:ext uri="{91240B29-F687-4f45-9708-019B960494DF}">
-                <a14:hiddenLine xmlns:a14="http://schemas.microsoft.com/office/drawing/2010/main" xmlns="" w="9525">
+                <a14:hiddenLine xmlns="" xmlns:a14="http://schemas.microsoft.com/office/drawing/2010/main" w="9525">
                   <a:solidFill>
                     <a:srgbClr val="000000"/>
                   </a:solidFill>
@@ -4801,7 +4801,7 @@
           <a:p>
             <a:fld id="{884429BD-A63B-4568-BA24-6943180A3A66}" type="datetimeFigureOut">
               <a:rPr lang="en-US" smtClean="0"/>
-              <a:t>8/8/2024</a:t>
+              <a:t>8/9/24</a:t>
             </a:fld>
             <a:endParaRPr lang="en-US"/>
           </a:p>
@@ -5068,7 +5068,7 @@
           <a:p>
             <a:fld id="{884429BD-A63B-4568-BA24-6943180A3A66}" type="datetimeFigureOut">
               <a:rPr lang="en-US" smtClean="0"/>
-              <a:t>8/8/2024</a:t>
+              <a:t>8/9/24</a:t>
             </a:fld>
             <a:endParaRPr lang="en-US"/>
           </a:p>
@@ -5264,7 +5264,7 @@
           <a:p>
             <a:fld id="{884429BD-A63B-4568-BA24-6943180A3A66}" type="datetimeFigureOut">
               <a:rPr lang="en-US" smtClean="0"/>
-              <a:t>8/8/2024</a:t>
+              <a:t>8/9/24</a:t>
             </a:fld>
             <a:endParaRPr lang="en-US"/>
           </a:p>
@@ -5527,7 +5527,7 @@
           <a:p>
             <a:fld id="{884429BD-A63B-4568-BA24-6943180A3A66}" type="datetimeFigureOut">
               <a:rPr lang="en-US" smtClean="0"/>
-              <a:t>8/8/2024</a:t>
+              <a:t>8/9/24</a:t>
             </a:fld>
             <a:endParaRPr lang="en-US"/>
           </a:p>
@@ -5961,7 +5961,7 @@
           <a:p>
             <a:fld id="{884429BD-A63B-4568-BA24-6943180A3A66}" type="datetimeFigureOut">
               <a:rPr lang="en-US" smtClean="0"/>
-              <a:t>8/8/2024</a:t>
+              <a:t>8/9/24</a:t>
             </a:fld>
             <a:endParaRPr lang="en-US"/>
           </a:p>
@@ -6507,7 +6507,7 @@
           <a:p>
             <a:fld id="{884429BD-A63B-4568-BA24-6943180A3A66}" type="datetimeFigureOut">
               <a:rPr lang="en-US" smtClean="0"/>
-              <a:t>8/8/2024</a:t>
+              <a:t>8/9/24</a:t>
             </a:fld>
             <a:endParaRPr lang="en-US"/>
           </a:p>
@@ -7227,7 +7227,7 @@
           <a:p>
             <a:fld id="{884429BD-A63B-4568-BA24-6943180A3A66}" type="datetimeFigureOut">
               <a:rPr lang="en-US" smtClean="0"/>
-              <a:t>8/8/2024</a:t>
+              <a:t>8/9/24</a:t>
             </a:fld>
             <a:endParaRPr lang="en-US"/>
           </a:p>
@@ -7397,7 +7397,7 @@
           <a:p>
             <a:fld id="{884429BD-A63B-4568-BA24-6943180A3A66}" type="datetimeFigureOut">
               <a:rPr lang="en-US" smtClean="0"/>
-              <a:t>8/8/2024</a:t>
+              <a:t>8/9/24</a:t>
             </a:fld>
             <a:endParaRPr lang="en-US"/>
           </a:p>
@@ -7577,7 +7577,7 @@
           <a:p>
             <a:fld id="{884429BD-A63B-4568-BA24-6943180A3A66}" type="datetimeFigureOut">
               <a:rPr lang="en-US" smtClean="0"/>
-              <a:t>8/8/2024</a:t>
+              <a:t>8/9/24</a:t>
             </a:fld>
             <a:endParaRPr lang="en-US"/>
           </a:p>
@@ -7747,7 +7747,7 @@
           <a:p>
             <a:fld id="{884429BD-A63B-4568-BA24-6943180A3A66}" type="datetimeFigureOut">
               <a:rPr lang="en-US" smtClean="0"/>
-              <a:t>8/8/2024</a:t>
+              <a:t>8/9/24</a:t>
             </a:fld>
             <a:endParaRPr lang="en-US"/>
           </a:p>
@@ -7997,7 +7997,7 @@
           <a:p>
             <a:fld id="{884429BD-A63B-4568-BA24-6943180A3A66}" type="datetimeFigureOut">
               <a:rPr lang="en-US" smtClean="0"/>
-              <a:t>8/8/2024</a:t>
+              <a:t>8/9/24</a:t>
             </a:fld>
             <a:endParaRPr lang="en-US"/>
           </a:p>
@@ -8229,7 +8229,7 @@
           <a:p>
             <a:fld id="{884429BD-A63B-4568-BA24-6943180A3A66}" type="datetimeFigureOut">
               <a:rPr lang="en-US" smtClean="0"/>
-              <a:t>8/8/2024</a:t>
+              <a:t>8/9/24</a:t>
             </a:fld>
             <a:endParaRPr lang="en-US"/>
           </a:p>
@@ -8610,7 +8610,7 @@
           <a:p>
             <a:fld id="{884429BD-A63B-4568-BA24-6943180A3A66}" type="datetimeFigureOut">
               <a:rPr lang="en-US" smtClean="0"/>
-              <a:t>8/8/2024</a:t>
+              <a:t>8/9/24</a:t>
             </a:fld>
             <a:endParaRPr lang="en-US"/>
           </a:p>
@@ -8728,7 +8728,7 @@
           <a:p>
             <a:fld id="{884429BD-A63B-4568-BA24-6943180A3A66}" type="datetimeFigureOut">
               <a:rPr lang="en-US" smtClean="0"/>
-              <a:t>8/8/2024</a:t>
+              <a:t>8/9/24</a:t>
             </a:fld>
             <a:endParaRPr lang="en-US"/>
           </a:p>
@@ -8823,7 +8823,7 @@
           <a:p>
             <a:fld id="{884429BD-A63B-4568-BA24-6943180A3A66}" type="datetimeFigureOut">
               <a:rPr lang="en-US" smtClean="0"/>
-              <a:t>8/8/2024</a:t>
+              <a:t>8/9/24</a:t>
             </a:fld>
             <a:endParaRPr lang="en-US"/>
           </a:p>
@@ -9072,7 +9072,7 @@
           <a:p>
             <a:fld id="{884429BD-A63B-4568-BA24-6943180A3A66}" type="datetimeFigureOut">
               <a:rPr lang="en-US" smtClean="0"/>
-              <a:t>8/8/2024</a:t>
+              <a:t>8/9/24</a:t>
             </a:fld>
             <a:endParaRPr lang="en-US"/>
           </a:p>
@@ -9352,7 +9352,7 @@
           <a:p>
             <a:fld id="{884429BD-A63B-4568-BA24-6943180A3A66}" type="datetimeFigureOut">
               <a:rPr lang="en-US" smtClean="0"/>
-              <a:t>8/8/2024</a:t>
+              <a:t>8/9/24</a:t>
             </a:fld>
             <a:endParaRPr lang="en-US"/>
           </a:p>
@@ -9468,7 +9468,7 @@
           <a:noFill/>
           <a:extLst>
             <a:ext uri="{909E8E84-426E-40dd-AFC4-6F175D3DCCD1}">
-              <a14:hiddenFill xmlns:a14="http://schemas.microsoft.com/office/drawing/2010/main" xmlns="">
+              <a14:hiddenFill xmlns="" xmlns:a14="http://schemas.microsoft.com/office/drawing/2010/main">
                 <a:solidFill>
                   <a:srgbClr val="FFFFFF"/>
                 </a:solidFill>
@@ -9542,7 +9542,7 @@
               </a:ln>
               <a:extLst>
                 <a:ext uri="{91240B29-F687-4f45-9708-019B960494DF}">
-                  <a14:hiddenLine xmlns:a14="http://schemas.microsoft.com/office/drawing/2010/main" xmlns="" w="9525">
+                  <a14:hiddenLine xmlns="" xmlns:a14="http://schemas.microsoft.com/office/drawing/2010/main" w="9525">
                     <a:solidFill>
                       <a:srgbClr val="000000"/>
                     </a:solidFill>
@@ -9632,7 +9632,7 @@
               </a:ln>
               <a:extLst>
                 <a:ext uri="{91240B29-F687-4f45-9708-019B960494DF}">
-                  <a14:hiddenLine xmlns:a14="http://schemas.microsoft.com/office/drawing/2010/main" xmlns="" w="9525">
+                  <a14:hiddenLine xmlns="" xmlns:a14="http://schemas.microsoft.com/office/drawing/2010/main" w="9525">
                     <a:solidFill>
                       <a:srgbClr val="000000"/>
                     </a:solidFill>
@@ -9722,7 +9722,7 @@
               </a:ln>
               <a:extLst>
                 <a:ext uri="{91240B29-F687-4f45-9708-019B960494DF}">
-                  <a14:hiddenLine xmlns:a14="http://schemas.microsoft.com/office/drawing/2010/main" xmlns="" w="9525">
+                  <a14:hiddenLine xmlns="" xmlns:a14="http://schemas.microsoft.com/office/drawing/2010/main" w="9525">
                     <a:solidFill>
                       <a:srgbClr val="000000"/>
                     </a:solidFill>
@@ -9784,7 +9784,7 @@
               </a:ln>
               <a:extLst>
                 <a:ext uri="{91240B29-F687-4f45-9708-019B960494DF}">
-                  <a14:hiddenLine xmlns:a14="http://schemas.microsoft.com/office/drawing/2010/main" xmlns="" w="9525">
+                  <a14:hiddenLine xmlns="" xmlns:a14="http://schemas.microsoft.com/office/drawing/2010/main" w="9525">
                     <a:solidFill>
                       <a:srgbClr val="000000"/>
                     </a:solidFill>
@@ -9874,7 +9874,7 @@
               </a:ln>
               <a:extLst>
                 <a:ext uri="{91240B29-F687-4f45-9708-019B960494DF}">
-                  <a14:hiddenLine xmlns:a14="http://schemas.microsoft.com/office/drawing/2010/main" xmlns="" w="9525">
+                  <a14:hiddenLine xmlns="" xmlns:a14="http://schemas.microsoft.com/office/drawing/2010/main" w="9525">
                     <a:solidFill>
                       <a:srgbClr val="000000"/>
                     </a:solidFill>
@@ -9936,7 +9936,7 @@
               </a:ln>
               <a:extLst>
                 <a:ext uri="{91240B29-F687-4f45-9708-019B960494DF}">
-                  <a14:hiddenLine xmlns:a14="http://schemas.microsoft.com/office/drawing/2010/main" xmlns="" w="9525">
+                  <a14:hiddenLine xmlns="" xmlns:a14="http://schemas.microsoft.com/office/drawing/2010/main" w="9525">
                     <a:solidFill>
                       <a:srgbClr val="000000"/>
                     </a:solidFill>
@@ -9998,7 +9998,7 @@
               </a:ln>
               <a:extLst>
                 <a:ext uri="{91240B29-F687-4f45-9708-019B960494DF}">
-                  <a14:hiddenLine xmlns:a14="http://schemas.microsoft.com/office/drawing/2010/main" xmlns="" w="9525">
+                  <a14:hiddenLine xmlns="" xmlns:a14="http://schemas.microsoft.com/office/drawing/2010/main" w="9525">
                     <a:solidFill>
                       <a:srgbClr val="000000"/>
                     </a:solidFill>
@@ -10088,7 +10088,7 @@
               </a:ln>
               <a:extLst>
                 <a:ext uri="{91240B29-F687-4f45-9708-019B960494DF}">
-                  <a14:hiddenLine xmlns:a14="http://schemas.microsoft.com/office/drawing/2010/main" xmlns="" w="9525">
+                  <a14:hiddenLine xmlns="" xmlns:a14="http://schemas.microsoft.com/office/drawing/2010/main" w="9525">
                     <a:solidFill>
                       <a:srgbClr val="000000"/>
                     </a:solidFill>
@@ -10178,7 +10178,7 @@
               </a:ln>
               <a:extLst>
                 <a:ext uri="{91240B29-F687-4f45-9708-019B960494DF}">
-                  <a14:hiddenLine xmlns:a14="http://schemas.microsoft.com/office/drawing/2010/main" xmlns="" w="9525">
+                  <a14:hiddenLine xmlns="" xmlns:a14="http://schemas.microsoft.com/office/drawing/2010/main" w="9525">
                     <a:solidFill>
                       <a:srgbClr val="000000"/>
                     </a:solidFill>
@@ -10240,7 +10240,7 @@
               </a:ln>
               <a:extLst>
                 <a:ext uri="{91240B29-F687-4f45-9708-019B960494DF}">
-                  <a14:hiddenLine xmlns:a14="http://schemas.microsoft.com/office/drawing/2010/main" xmlns="" w="9525">
+                  <a14:hiddenLine xmlns="" xmlns:a14="http://schemas.microsoft.com/office/drawing/2010/main" w="9525">
                     <a:solidFill>
                       <a:srgbClr val="000000"/>
                     </a:solidFill>
@@ -10350,7 +10350,7 @@
               </a:ln>
               <a:extLst>
                 <a:ext uri="{91240B29-F687-4f45-9708-019B960494DF}">
-                  <a14:hiddenLine xmlns:a14="http://schemas.microsoft.com/office/drawing/2010/main" xmlns="" w="9525">
+                  <a14:hiddenLine xmlns="" xmlns:a14="http://schemas.microsoft.com/office/drawing/2010/main" w="9525">
                     <a:solidFill>
                       <a:srgbClr val="000000"/>
                     </a:solidFill>
@@ -10434,7 +10434,7 @@
               </a:ln>
               <a:extLst>
                 <a:ext uri="{91240B29-F687-4f45-9708-019B960494DF}">
-                  <a14:hiddenLine xmlns:a14="http://schemas.microsoft.com/office/drawing/2010/main" xmlns="" w="9525">
+                  <a14:hiddenLine xmlns="" xmlns:a14="http://schemas.microsoft.com/office/drawing/2010/main" w="9525">
                     <a:solidFill>
                       <a:srgbClr val="000000"/>
                     </a:solidFill>
@@ -10496,7 +10496,7 @@
               </a:ln>
               <a:extLst>
                 <a:ext uri="{91240B29-F687-4f45-9708-019B960494DF}">
-                  <a14:hiddenLine xmlns:a14="http://schemas.microsoft.com/office/drawing/2010/main" xmlns="" w="9525">
+                  <a14:hiddenLine xmlns="" xmlns:a14="http://schemas.microsoft.com/office/drawing/2010/main" w="9525">
                     <a:solidFill>
                       <a:srgbClr val="000000"/>
                     </a:solidFill>
@@ -10558,7 +10558,7 @@
               </a:ln>
               <a:extLst>
                 <a:ext uri="{91240B29-F687-4f45-9708-019B960494DF}">
-                  <a14:hiddenLine xmlns:a14="http://schemas.microsoft.com/office/drawing/2010/main" xmlns="" w="9525">
+                  <a14:hiddenLine xmlns="" xmlns:a14="http://schemas.microsoft.com/office/drawing/2010/main" w="9525">
                     <a:solidFill>
                       <a:srgbClr val="000000"/>
                     </a:solidFill>
@@ -10648,7 +10648,7 @@
               </a:ln>
               <a:extLst>
                 <a:ext uri="{91240B29-F687-4f45-9708-019B960494DF}">
-                  <a14:hiddenLine xmlns:a14="http://schemas.microsoft.com/office/drawing/2010/main" xmlns="" w="9525">
+                  <a14:hiddenLine xmlns="" xmlns:a14="http://schemas.microsoft.com/office/drawing/2010/main" w="9525">
                     <a:solidFill>
                       <a:srgbClr val="000000"/>
                     </a:solidFill>
@@ -10682,7 +10682,7 @@
               </a:ln>
               <a:extLst>
                 <a:ext uri="{91240B29-F687-4f45-9708-019B960494DF}">
-                  <a14:hiddenLine xmlns:a14="http://schemas.microsoft.com/office/drawing/2010/main" xmlns="" w="9525">
+                  <a14:hiddenLine xmlns="" xmlns:a14="http://schemas.microsoft.com/office/drawing/2010/main" w="9525">
                     <a:solidFill>
                       <a:srgbClr val="000000"/>
                     </a:solidFill>
@@ -10747,7 +10747,7 @@
               </a:ln>
               <a:extLst>
                 <a:ext uri="{91240B29-F687-4f45-9708-019B960494DF}">
-                  <a14:hiddenLine xmlns:a14="http://schemas.microsoft.com/office/drawing/2010/main" xmlns="" w="9525">
+                  <a14:hiddenLine xmlns="" xmlns:a14="http://schemas.microsoft.com/office/drawing/2010/main" w="9525">
                     <a:solidFill>
                       <a:srgbClr val="000000"/>
                     </a:solidFill>
@@ -10837,7 +10837,7 @@
               </a:ln>
               <a:extLst>
                 <a:ext uri="{91240B29-F687-4f45-9708-019B960494DF}">
-                  <a14:hiddenLine xmlns:a14="http://schemas.microsoft.com/office/drawing/2010/main" xmlns="" w="9525">
+                  <a14:hiddenLine xmlns="" xmlns:a14="http://schemas.microsoft.com/office/drawing/2010/main" w="9525">
                     <a:solidFill>
                       <a:srgbClr val="000000"/>
                     </a:solidFill>
@@ -10899,7 +10899,7 @@
               </a:ln>
               <a:extLst>
                 <a:ext uri="{91240B29-F687-4f45-9708-019B960494DF}">
-                  <a14:hiddenLine xmlns:a14="http://schemas.microsoft.com/office/drawing/2010/main" xmlns="" w="9525">
+                  <a14:hiddenLine xmlns="" xmlns:a14="http://schemas.microsoft.com/office/drawing/2010/main" w="9525">
                     <a:solidFill>
                       <a:srgbClr val="000000"/>
                     </a:solidFill>
@@ -10989,7 +10989,7 @@
               </a:ln>
               <a:extLst>
                 <a:ext uri="{91240B29-F687-4f45-9708-019B960494DF}">
-                  <a14:hiddenLine xmlns:a14="http://schemas.microsoft.com/office/drawing/2010/main" xmlns="" w="9525">
+                  <a14:hiddenLine xmlns="" xmlns:a14="http://schemas.microsoft.com/office/drawing/2010/main" w="9525">
                     <a:solidFill>
                       <a:srgbClr val="000000"/>
                     </a:solidFill>
@@ -11054,7 +11054,7 @@
               </a:ln>
               <a:extLst>
                 <a:ext uri="{91240B29-F687-4f45-9708-019B960494DF}">
-                  <a14:hiddenLine xmlns:a14="http://schemas.microsoft.com/office/drawing/2010/main" xmlns="" w="9525">
+                  <a14:hiddenLine xmlns="" xmlns:a14="http://schemas.microsoft.com/office/drawing/2010/main" w="9525">
                     <a:solidFill>
                       <a:srgbClr val="000000"/>
                     </a:solidFill>
@@ -11116,7 +11116,7 @@
               </a:ln>
               <a:extLst>
                 <a:ext uri="{91240B29-F687-4f45-9708-019B960494DF}">
-                  <a14:hiddenLine xmlns:a14="http://schemas.microsoft.com/office/drawing/2010/main" xmlns="" w="9525">
+                  <a14:hiddenLine xmlns="" xmlns:a14="http://schemas.microsoft.com/office/drawing/2010/main" w="9525">
                     <a:solidFill>
                       <a:srgbClr val="000000"/>
                     </a:solidFill>
@@ -11206,7 +11206,7 @@
               </a:ln>
               <a:extLst>
                 <a:ext uri="{91240B29-F687-4f45-9708-019B960494DF}">
-                  <a14:hiddenLine xmlns:a14="http://schemas.microsoft.com/office/drawing/2010/main" xmlns="" w="9525">
+                  <a14:hiddenLine xmlns="" xmlns:a14="http://schemas.microsoft.com/office/drawing/2010/main" w="9525">
                     <a:solidFill>
                       <a:srgbClr val="000000"/>
                     </a:solidFill>
@@ -11296,7 +11296,7 @@
               </a:ln>
               <a:extLst>
                 <a:ext uri="{91240B29-F687-4f45-9708-019B960494DF}">
-                  <a14:hiddenLine xmlns:a14="http://schemas.microsoft.com/office/drawing/2010/main" xmlns="" w="9525">
+                  <a14:hiddenLine xmlns="" xmlns:a14="http://schemas.microsoft.com/office/drawing/2010/main" w="9525">
                     <a:solidFill>
                       <a:srgbClr val="000000"/>
                     </a:solidFill>
@@ -11361,7 +11361,7 @@
               </a:ln>
               <a:extLst>
                 <a:ext uri="{91240B29-F687-4f45-9708-019B960494DF}">
-                  <a14:hiddenLine xmlns:a14="http://schemas.microsoft.com/office/drawing/2010/main" xmlns="" w="9525">
+                  <a14:hiddenLine xmlns="" xmlns:a14="http://schemas.microsoft.com/office/drawing/2010/main" w="9525">
                     <a:solidFill>
                       <a:srgbClr val="000000"/>
                     </a:solidFill>
@@ -11481,7 +11481,7 @@
               </a:ln>
               <a:extLst>
                 <a:ext uri="{91240B29-F687-4f45-9708-019B960494DF}">
-                  <a14:hiddenLine xmlns:a14="http://schemas.microsoft.com/office/drawing/2010/main" xmlns="" w="9525">
+                  <a14:hiddenLine xmlns="" xmlns:a14="http://schemas.microsoft.com/office/drawing/2010/main" w="9525">
                     <a:solidFill>
                       <a:srgbClr val="000000"/>
                     </a:solidFill>
@@ -11579,7 +11579,7 @@
               </a:ln>
               <a:extLst>
                 <a:ext uri="{91240B29-F687-4f45-9708-019B960494DF}">
-                  <a14:hiddenLine xmlns:a14="http://schemas.microsoft.com/office/drawing/2010/main" xmlns="" w="9525">
+                  <a14:hiddenLine xmlns="" xmlns:a14="http://schemas.microsoft.com/office/drawing/2010/main" w="9525">
                     <a:solidFill>
                       <a:srgbClr val="000000"/>
                     </a:solidFill>
@@ -11694,7 +11694,7 @@
               </a:ln>
               <a:extLst>
                 <a:ext uri="{91240B29-F687-4f45-9708-019B960494DF}">
-                  <a14:hiddenLine xmlns:a14="http://schemas.microsoft.com/office/drawing/2010/main" xmlns="" w="9525">
+                  <a14:hiddenLine xmlns="" xmlns:a14="http://schemas.microsoft.com/office/drawing/2010/main" w="9525">
                     <a:solidFill>
                       <a:srgbClr val="000000"/>
                     </a:solidFill>
@@ -11784,7 +11784,7 @@
               </a:ln>
               <a:extLst>
                 <a:ext uri="{91240B29-F687-4f45-9708-019B960494DF}">
-                  <a14:hiddenLine xmlns:a14="http://schemas.microsoft.com/office/drawing/2010/main" xmlns="" w="9525">
+                  <a14:hiddenLine xmlns="" xmlns:a14="http://schemas.microsoft.com/office/drawing/2010/main" w="9525">
                     <a:solidFill>
                       <a:srgbClr val="000000"/>
                     </a:solidFill>
@@ -11849,7 +11849,7 @@
               </a:ln>
               <a:extLst>
                 <a:ext uri="{91240B29-F687-4f45-9708-019B960494DF}">
-                  <a14:hiddenLine xmlns:a14="http://schemas.microsoft.com/office/drawing/2010/main" xmlns="" w="9525">
+                  <a14:hiddenLine xmlns="" xmlns:a14="http://schemas.microsoft.com/office/drawing/2010/main" w="9525">
                     <a:solidFill>
                       <a:srgbClr val="000000"/>
                     </a:solidFill>
@@ -11939,7 +11939,7 @@
               </a:ln>
               <a:extLst>
                 <a:ext uri="{91240B29-F687-4f45-9708-019B960494DF}">
-                  <a14:hiddenLine xmlns:a14="http://schemas.microsoft.com/office/drawing/2010/main" xmlns="" w="9525">
+                  <a14:hiddenLine xmlns="" xmlns:a14="http://schemas.microsoft.com/office/drawing/2010/main" w="9525">
                     <a:solidFill>
                       <a:srgbClr val="000000"/>
                     </a:solidFill>
@@ -12007,7 +12007,7 @@
               </a:ln>
               <a:extLst>
                 <a:ext uri="{91240B29-F687-4f45-9708-019B960494DF}">
-                  <a14:hiddenLine xmlns:a14="http://schemas.microsoft.com/office/drawing/2010/main" xmlns="" w="9525">
+                  <a14:hiddenLine xmlns="" xmlns:a14="http://schemas.microsoft.com/office/drawing/2010/main" w="9525">
                     <a:solidFill>
                       <a:srgbClr val="000000"/>
                     </a:solidFill>
@@ -12097,7 +12097,7 @@
               </a:ln>
               <a:extLst>
                 <a:ext uri="{91240B29-F687-4f45-9708-019B960494DF}">
-                  <a14:hiddenLine xmlns:a14="http://schemas.microsoft.com/office/drawing/2010/main" xmlns="" w="9525">
+                  <a14:hiddenLine xmlns="" xmlns:a14="http://schemas.microsoft.com/office/drawing/2010/main" w="9525">
                     <a:solidFill>
                       <a:srgbClr val="000000"/>
                     </a:solidFill>
@@ -12165,7 +12165,7 @@
               </a:ln>
               <a:extLst>
                 <a:ext uri="{91240B29-F687-4f45-9708-019B960494DF}">
-                  <a14:hiddenLine xmlns:a14="http://schemas.microsoft.com/office/drawing/2010/main" xmlns="" w="9525">
+                  <a14:hiddenLine xmlns="" xmlns:a14="http://schemas.microsoft.com/office/drawing/2010/main" w="9525">
                     <a:solidFill>
                       <a:srgbClr val="000000"/>
                     </a:solidFill>
@@ -12255,7 +12255,7 @@
               </a:ln>
               <a:extLst>
                 <a:ext uri="{91240B29-F687-4f45-9708-019B960494DF}">
-                  <a14:hiddenLine xmlns:a14="http://schemas.microsoft.com/office/drawing/2010/main" xmlns="" w="9525">
+                  <a14:hiddenLine xmlns="" xmlns:a14="http://schemas.microsoft.com/office/drawing/2010/main" w="9525">
                     <a:solidFill>
                       <a:srgbClr val="000000"/>
                     </a:solidFill>
@@ -12289,7 +12289,7 @@
               </a:ln>
               <a:extLst>
                 <a:ext uri="{91240B29-F687-4f45-9708-019B960494DF}">
-                  <a14:hiddenLine xmlns:a14="http://schemas.microsoft.com/office/drawing/2010/main" xmlns="" w="9525">
+                  <a14:hiddenLine xmlns="" xmlns:a14="http://schemas.microsoft.com/office/drawing/2010/main" w="9525">
                     <a:solidFill>
                       <a:srgbClr val="000000"/>
                     </a:solidFill>
@@ -12429,7 +12429,7 @@
           <a:p>
             <a:fld id="{884429BD-A63B-4568-BA24-6943180A3A66}" type="datetimeFigureOut">
               <a:rPr lang="en-US" smtClean="0"/>
-              <a:t>8/8/2024</a:t>
+              <a:t>8/9/24</a:t>
             </a:fld>
             <a:endParaRPr lang="en-US"/>
           </a:p>
@@ -13961,21 +13961,66 @@
           </a:p>
         </p:txBody>
       </p:sp>
+      <p:sp>
+        <p:nvSpPr>
+          <p:cNvPr id="9" name="Content Placeholder 8">
+            <a:extLst>
+              <a:ext uri="{FF2B5EF4-FFF2-40B4-BE49-F238E27FC236}">
+                <a16:creationId xmlns:a16="http://schemas.microsoft.com/office/drawing/2014/main" id="{813B0854-5B67-E1F3-5879-2A111BEBB9EC}"/>
+              </a:ext>
+            </a:extLst>
+          </p:cNvPr>
+          <p:cNvSpPr>
+            <a:spLocks noGrp="1"/>
+          </p:cNvSpPr>
+          <p:nvPr>
+            <p:ph sz="half" idx="2"/>
+          </p:nvPr>
+        </p:nvSpPr>
+        <p:spPr>
+          <a:xfrm>
+            <a:off x="7010400" y="2249486"/>
+            <a:ext cx="4037011" cy="3541714"/>
+          </a:xfrm>
+        </p:spPr>
+        <p:txBody>
+          <a:bodyPr>
+            <a:normAutofit fontScale="92500" lnSpcReduction="20000"/>
+          </a:bodyPr>
+          <a:lstStyle/>
+          <a:p>
+            <a:r>
+              <a:rPr lang="en-US" dirty="0"/>
+              <a:t>Over 60% of people attended only one appointment during the months of April – June. </a:t>
+            </a:r>
+          </a:p>
+          <a:p>
+            <a:r>
+              <a:rPr lang="en-US" dirty="0"/>
+              <a:t>Over 99% of people attended less than 12 appointments in that time. </a:t>
+            </a:r>
+          </a:p>
+          <a:p>
+            <a:r>
+              <a:rPr lang="en-US" dirty="0"/>
+              <a:t>Outliers in the data reach up to 88 appointments in the 3 month timeframe.</a:t>
+            </a:r>
+          </a:p>
+        </p:txBody>
+      </p:sp>
       <p:pic>
         <p:nvPicPr>
-          <p:cNvPr id="10" name="Content Placeholder 9">
+          <p:cNvPr id="5" name="Picture 4">
             <a:extLst>
               <a:ext uri="{FF2B5EF4-FFF2-40B4-BE49-F238E27FC236}">
-                <a16:creationId xmlns:a16="http://schemas.microsoft.com/office/drawing/2014/main" id="{C51CC489-8908-3523-59D5-A016CD58B3F6}"/>
+                <a16:creationId xmlns:a16="http://schemas.microsoft.com/office/drawing/2014/main" id="{21572002-3FCC-D312-1DA0-4778C3AD3752}"/>
               </a:ext>
             </a:extLst>
           </p:cNvPr>
           <p:cNvPicPr>
-            <a:picLocks noGrp="1" noChangeAspect="1"/>
+            <a:picLocks noChangeAspect="1"/>
           </p:cNvPicPr>
-          <p:nvPr>
-            <p:ph sz="half" idx="1"/>
-          </p:nvPr>
+          <p:nvPr/>
         </p:nvPicPr>
         <p:blipFill>
           <a:blip r:embed="rId2"/>
@@ -13985,56 +14030,14 @@
         </p:blipFill>
         <p:spPr>
           <a:xfrm>
-            <a:off x="830103" y="2249487"/>
-            <a:ext cx="5053007" cy="3886269"/>
+            <a:off x="431800" y="2616200"/>
+            <a:ext cx="6350000" cy="3175000"/>
           </a:xfrm>
           <a:prstGeom prst="rect">
             <a:avLst/>
           </a:prstGeom>
         </p:spPr>
       </p:pic>
-      <p:sp>
-        <p:nvSpPr>
-          <p:cNvPr id="9" name="Content Placeholder 8">
-            <a:extLst>
-              <a:ext uri="{FF2B5EF4-FFF2-40B4-BE49-F238E27FC236}">
-                <a16:creationId xmlns:a16="http://schemas.microsoft.com/office/drawing/2014/main" id="{813B0854-5B67-E1F3-5879-2A111BEBB9EC}"/>
-              </a:ext>
-            </a:extLst>
-          </p:cNvPr>
-          <p:cNvSpPr>
-            <a:spLocks noGrp="1"/>
-          </p:cNvSpPr>
-          <p:nvPr>
-            <p:ph sz="half" idx="2"/>
-          </p:nvPr>
-        </p:nvSpPr>
-        <p:spPr/>
-        <p:txBody>
-          <a:bodyPr>
-            <a:normAutofit fontScale="92500"/>
-          </a:bodyPr>
-          <a:lstStyle/>
-          <a:p>
-            <a:r>
-              <a:rPr lang="en-US" dirty="0"/>
-              <a:t>Over 60% of people attended only one appointment during the months of April – June. </a:t>
-            </a:r>
-          </a:p>
-          <a:p>
-            <a:r>
-              <a:rPr lang="en-US" dirty="0"/>
-              <a:t>Over 99% of people attended less than 12 appointments in that time. </a:t>
-            </a:r>
-          </a:p>
-          <a:p>
-            <a:r>
-              <a:rPr lang="en-US" dirty="0"/>
-              <a:t>Outliers in the data reach up to 88 appointments in the 3 month timeframe.</a:t>
-            </a:r>
-          </a:p>
-        </p:txBody>
-      </p:sp>
     </p:spTree>
     <p:extLst>
       <p:ext uri="{BB962C8B-B14F-4D97-AF65-F5344CB8AC3E}">
@@ -15099,21 +15102,44 @@
           </a:p>
         </p:txBody>
       </p:sp>
+      <p:sp>
+        <p:nvSpPr>
+          <p:cNvPr id="7" name="Content Placeholder 6">
+            <a:extLst>
+              <a:ext uri="{FF2B5EF4-FFF2-40B4-BE49-F238E27FC236}">
+                <a16:creationId xmlns:a16="http://schemas.microsoft.com/office/drawing/2014/main" id="{A711B1AF-A52E-98CE-5EE3-80AE69A4086D}"/>
+              </a:ext>
+            </a:extLst>
+          </p:cNvPr>
+          <p:cNvSpPr>
+            <a:spLocks noGrp="1"/>
+          </p:cNvSpPr>
+          <p:nvPr>
+            <p:ph sz="half" idx="2"/>
+          </p:nvPr>
+        </p:nvSpPr>
+        <p:spPr/>
+        <p:txBody>
+          <a:bodyPr/>
+          <a:lstStyle/>
+          <a:p>
+            <a:endParaRPr lang="en-US"/>
+          </a:p>
+        </p:txBody>
+      </p:sp>
       <p:pic>
         <p:nvPicPr>
-          <p:cNvPr id="5" name="Content Placeholder 4">
+          <p:cNvPr id="4" name="Picture 3" descr="A graph with red rectangular bars&#10;&#10;Description automatically generated">
             <a:extLst>
               <a:ext uri="{FF2B5EF4-FFF2-40B4-BE49-F238E27FC236}">
-                <a16:creationId xmlns:a16="http://schemas.microsoft.com/office/drawing/2014/main" id="{D5FDEF51-2647-38AF-0AFB-90A64F95094C}"/>
+                <a16:creationId xmlns:a16="http://schemas.microsoft.com/office/drawing/2014/main" id="{455BCFD5-A1CA-67ED-C9EB-C912FF2445B9}"/>
               </a:ext>
             </a:extLst>
           </p:cNvPr>
           <p:cNvPicPr>
-            <a:picLocks noGrp="1" noChangeAspect="1"/>
+            <a:picLocks noChangeAspect="1"/>
           </p:cNvPicPr>
-          <p:nvPr>
-            <p:ph sz="half" idx="2"/>
-          </p:nvPr>
+          <p:nvPr/>
         </p:nvPicPr>
         <p:blipFill>
           <a:blip r:embed="rId2"/>
@@ -15123,8 +15149,8 @@
         </p:blipFill>
         <p:spPr>
           <a:xfrm>
-            <a:off x="5772014" y="1977817"/>
-            <a:ext cx="5503475" cy="4261665"/>
+            <a:off x="5831839" y="1764030"/>
+            <a:ext cx="5640493" cy="4230370"/>
           </a:xfrm>
           <a:prstGeom prst="rect">
             <a:avLst/>
@@ -16383,10 +16409,10 @@
       </p:sp>
       <p:pic>
         <p:nvPicPr>
-          <p:cNvPr id="6" name="Content Placeholder 4">
+          <p:cNvPr id="3" name="Picture 2">
             <a:extLst>
               <a:ext uri="{FF2B5EF4-FFF2-40B4-BE49-F238E27FC236}">
-                <a16:creationId xmlns:a16="http://schemas.microsoft.com/office/drawing/2014/main" id="{9EDE0688-E63C-87A6-746A-12EB26B139D0}"/>
+                <a16:creationId xmlns:a16="http://schemas.microsoft.com/office/drawing/2014/main" id="{99108A5E-8452-D6CC-B84A-B7F593C688F7}"/>
               </a:ext>
             </a:extLst>
           </p:cNvPr>
@@ -16403,8 +16429,8 @@
         </p:blipFill>
         <p:spPr>
           <a:xfrm>
-            <a:off x="7004842" y="4171948"/>
-            <a:ext cx="3209925" cy="1771650"/>
+            <a:off x="7131049" y="4172741"/>
+            <a:ext cx="2557905" cy="1770857"/>
           </a:xfrm>
           <a:prstGeom prst="rect">
             <a:avLst/>
@@ -17816,10 +17842,10 @@
       </p:pic>
       <p:pic>
         <p:nvPicPr>
-          <p:cNvPr id="6" name="Content Placeholder 4">
+          <p:cNvPr id="4" name="Picture 3" descr="A graph of a number of hours&#10;&#10;Description automatically generated">
             <a:extLst>
               <a:ext uri="{FF2B5EF4-FFF2-40B4-BE49-F238E27FC236}">
-                <a16:creationId xmlns:a16="http://schemas.microsoft.com/office/drawing/2014/main" id="{B721C096-445F-D3F8-48CF-569CB97F9D5D}"/>
+                <a16:creationId xmlns:a16="http://schemas.microsoft.com/office/drawing/2014/main" id="{775D85A3-1991-743E-CEC0-8517AB993D8B}"/>
               </a:ext>
             </a:extLst>
           </p:cNvPr>
@@ -17836,8 +17862,8 @@
         </p:blipFill>
         <p:spPr>
           <a:xfrm>
-            <a:off x="6933980" y="4760913"/>
-            <a:ext cx="2500413" cy="1867991"/>
+            <a:off x="6249657" y="4850441"/>
+            <a:ext cx="3656343" cy="1828172"/>
           </a:xfrm>
           <a:prstGeom prst="rect">
             <a:avLst/>

</xml_diff>